<commit_message>
powerpoint and some additional code changes
</commit_message>
<xml_diff>
--- a/ProjectHealthPPT.pptx
+++ b/ProjectHealthPPT.pptx
@@ -5,13 +5,21 @@
     <p:sldMasterId id="2147483875" r:id="rId1"/>
   </p:sldMasterIdLst>
   <p:notesMasterIdLst>
-    <p:notesMasterId r:id="rId6"/>
+    <p:notesMasterId r:id="rId14"/>
   </p:notesMasterIdLst>
   <p:sldIdLst>
     <p:sldId id="256" r:id="rId2"/>
     <p:sldId id="257" r:id="rId3"/>
     <p:sldId id="258" r:id="rId4"/>
     <p:sldId id="259" r:id="rId5"/>
+    <p:sldId id="260" r:id="rId6"/>
+    <p:sldId id="265" r:id="rId7"/>
+    <p:sldId id="261" r:id="rId8"/>
+    <p:sldId id="262" r:id="rId9"/>
+    <p:sldId id="268" r:id="rId10"/>
+    <p:sldId id="263" r:id="rId11"/>
+    <p:sldId id="264" r:id="rId12"/>
+    <p:sldId id="266" r:id="rId13"/>
   </p:sldIdLst>
   <p:sldSz cx="12192000" cy="6858000"/>
   <p:notesSz cx="6858000" cy="9144000"/>
@@ -200,7 +208,7 @@
           <a:p>
             <a:fld id="{A3223976-33E3-D248-BAF5-5B38B964CEC8}" type="datetimeFigureOut">
               <a:rPr lang="en-US" smtClean="0"/>
-              <a:t>9/15/2016</a:t>
+              <a:t>9/15/16</a:t>
             </a:fld>
             <a:endParaRPr lang="en-US"/>
           </a:p>
@@ -1054,7 +1062,7 @@
           <a:p>
             <a:fld id="{48A87A34-81AB-432B-8DAE-1953F412C126}" type="datetimeFigureOut">
               <a:rPr lang="en-US" smtClean="0"/>
-              <a:t>9/15/2016</a:t>
+              <a:t>9/15/16</a:t>
             </a:fld>
             <a:endParaRPr lang="en-US" dirty="0"/>
           </a:p>
@@ -1356,7 +1364,7 @@
             <a:fld id="{48A87A34-81AB-432B-8DAE-1953F412C126}" type="datetimeFigureOut">
               <a:rPr lang="en-US" smtClean="0"/>
               <a:pPr/>
-              <a:t>9/15/2016</a:t>
+              <a:t>9/15/16</a:t>
             </a:fld>
             <a:endParaRPr lang="en-US" dirty="0"/>
           </a:p>
@@ -1606,7 +1614,7 @@
             <a:fld id="{48A87A34-81AB-432B-8DAE-1953F412C126}" type="datetimeFigureOut">
               <a:rPr lang="en-US" smtClean="0"/>
               <a:pPr/>
-              <a:t>9/15/2016</a:t>
+              <a:t>9/15/16</a:t>
             </a:fld>
             <a:endParaRPr lang="en-US" dirty="0"/>
           </a:p>
@@ -2148,7 +2156,7 @@
             <a:fld id="{48A87A34-81AB-432B-8DAE-1953F412C126}" type="datetimeFigureOut">
               <a:rPr lang="en-US" smtClean="0"/>
               <a:pPr/>
-              <a:t>9/15/2016</a:t>
+              <a:t>9/15/16</a:t>
             </a:fld>
             <a:endParaRPr lang="en-US" dirty="0"/>
           </a:p>
@@ -2398,7 +2406,7 @@
             <a:fld id="{48A87A34-81AB-432B-8DAE-1953F412C126}" type="datetimeFigureOut">
               <a:rPr lang="en-US" smtClean="0"/>
               <a:pPr/>
-              <a:t>9/15/2016</a:t>
+              <a:t>9/15/16</a:t>
             </a:fld>
             <a:endParaRPr lang="en-US" dirty="0"/>
           </a:p>
@@ -2932,7 +2940,7 @@
             <a:fld id="{48A87A34-81AB-432B-8DAE-1953F412C126}" type="datetimeFigureOut">
               <a:rPr lang="en-US" smtClean="0"/>
               <a:pPr/>
-              <a:t>9/15/2016</a:t>
+              <a:t>9/15/16</a:t>
             </a:fld>
             <a:endParaRPr lang="en-US" dirty="0"/>
           </a:p>
@@ -3231,7 +3239,7 @@
             <a:fld id="{48A87A34-81AB-432B-8DAE-1953F412C126}" type="datetimeFigureOut">
               <a:rPr lang="en-US" smtClean="0"/>
               <a:pPr/>
-              <a:t>9/15/2016</a:t>
+              <a:t>9/15/16</a:t>
             </a:fld>
             <a:endParaRPr lang="en-US" dirty="0"/>
           </a:p>
@@ -3406,7 +3414,7 @@
           <a:p>
             <a:fld id="{48A87A34-81AB-432B-8DAE-1953F412C126}" type="datetimeFigureOut">
               <a:rPr lang="en-US" smtClean="0"/>
-              <a:t>9/15/2016</a:t>
+              <a:t>9/15/16</a:t>
             </a:fld>
             <a:endParaRPr lang="en-US" dirty="0"/>
           </a:p>
@@ -3586,7 +3594,7 @@
           <a:p>
             <a:fld id="{48A87A34-81AB-432B-8DAE-1953F412C126}" type="datetimeFigureOut">
               <a:rPr lang="en-US" smtClean="0"/>
-              <a:t>9/15/2016</a:t>
+              <a:t>9/15/16</a:t>
             </a:fld>
             <a:endParaRPr lang="en-US" dirty="0"/>
           </a:p>
@@ -3761,7 +3769,7 @@
           <a:p>
             <a:fld id="{48A87A34-81AB-432B-8DAE-1953F412C126}" type="datetimeFigureOut">
               <a:rPr lang="en-US" smtClean="0"/>
-              <a:t>9/15/2016</a:t>
+              <a:t>9/15/16</a:t>
             </a:fld>
             <a:endParaRPr lang="en-US" dirty="0"/>
           </a:p>
@@ -4012,7 +4020,7 @@
           <a:p>
             <a:fld id="{48A87A34-81AB-432B-8DAE-1953F412C126}" type="datetimeFigureOut">
               <a:rPr lang="en-US" smtClean="0"/>
-              <a:t>9/15/2016</a:t>
+              <a:t>9/15/16</a:t>
             </a:fld>
             <a:endParaRPr lang="en-US" dirty="0"/>
           </a:p>
@@ -4314,7 +4322,7 @@
           <a:p>
             <a:fld id="{48A87A34-81AB-432B-8DAE-1953F412C126}" type="datetimeFigureOut">
               <a:rPr lang="en-US" smtClean="0"/>
-              <a:t>9/15/2016</a:t>
+              <a:t>9/15/16</a:t>
             </a:fld>
             <a:endParaRPr lang="en-US" dirty="0"/>
           </a:p>
@@ -4756,7 +4764,7 @@
           <a:p>
             <a:fld id="{48A87A34-81AB-432B-8DAE-1953F412C126}" type="datetimeFigureOut">
               <a:rPr lang="en-US" smtClean="0"/>
-              <a:t>9/15/2016</a:t>
+              <a:t>9/15/16</a:t>
             </a:fld>
             <a:endParaRPr lang="en-US" dirty="0"/>
           </a:p>
@@ -4874,7 +4882,7 @@
           <a:p>
             <a:fld id="{48A87A34-81AB-432B-8DAE-1953F412C126}" type="datetimeFigureOut">
               <a:rPr lang="en-US" smtClean="0"/>
-              <a:t>9/15/2016</a:t>
+              <a:t>9/15/16</a:t>
             </a:fld>
             <a:endParaRPr lang="en-US" dirty="0"/>
           </a:p>
@@ -4969,7 +4977,7 @@
           <a:p>
             <a:fld id="{48A87A34-81AB-432B-8DAE-1953F412C126}" type="datetimeFigureOut">
               <a:rPr lang="en-US" smtClean="0"/>
-              <a:t>9/15/2016</a:t>
+              <a:t>9/15/16</a:t>
             </a:fld>
             <a:endParaRPr lang="en-US" dirty="0"/>
           </a:p>
@@ -5257,7 +5265,7 @@
           <a:p>
             <a:fld id="{48A87A34-81AB-432B-8DAE-1953F412C126}" type="datetimeFigureOut">
               <a:rPr lang="en-US" smtClean="0"/>
-              <a:t>9/15/2016</a:t>
+              <a:t>9/15/16</a:t>
             </a:fld>
             <a:endParaRPr lang="en-US" dirty="0"/>
           </a:p>
@@ -5554,7 +5562,7 @@
             <a:fld id="{48A87A34-81AB-432B-8DAE-1953F412C126}" type="datetimeFigureOut">
               <a:rPr lang="en-US" smtClean="0"/>
               <a:pPr/>
-              <a:t>9/15/2016</a:t>
+              <a:t>9/15/16</a:t>
             </a:fld>
             <a:endParaRPr lang="en-US" dirty="0"/>
           </a:p>
@@ -6085,7 +6093,7 @@
             <a:fld id="{48A87A34-81AB-432B-8DAE-1953F412C126}" type="datetimeFigureOut">
               <a:rPr lang="en-US" smtClean="0"/>
               <a:pPr/>
-              <a:t>9/15/2016</a:t>
+              <a:t>9/15/16</a:t>
             </a:fld>
             <a:endParaRPr lang="en-US" dirty="0"/>
           </a:p>
@@ -6704,6 +6712,270 @@
 </p:sld>
 </file>
 
+<file path=ppt/slides/slide10.xml><?xml version="1.0" encoding="utf-8"?>
+<p:sld xmlns:a="http://schemas.openxmlformats.org/drawingml/2006/main" xmlns:r="http://schemas.openxmlformats.org/officeDocument/2006/relationships" xmlns:p="http://schemas.openxmlformats.org/presentationml/2006/main">
+  <p:cSld>
+    <p:spTree>
+      <p:nvGrpSpPr>
+        <p:cNvPr id="1" name=""/>
+        <p:cNvGrpSpPr/>
+        <p:nvPr/>
+      </p:nvGrpSpPr>
+      <p:grpSpPr>
+        <a:xfrm>
+          <a:off x="0" y="0"/>
+          <a:ext cx="0" cy="0"/>
+          <a:chOff x="0" y="0"/>
+          <a:chExt cx="0" cy="0"/>
+        </a:xfrm>
+      </p:grpSpPr>
+      <p:sp>
+        <p:nvSpPr>
+          <p:cNvPr id="2" name="Title 1"/>
+          <p:cNvSpPr>
+            <a:spLocks noGrp="1"/>
+          </p:cNvSpPr>
+          <p:nvPr>
+            <p:ph type="title"/>
+          </p:nvPr>
+        </p:nvSpPr>
+        <p:spPr/>
+        <p:txBody>
+          <a:bodyPr/>
+          <a:lstStyle/>
+          <a:p>
+            <a:r>
+              <a:rPr lang="en-US" dirty="0" smtClean="0"/>
+              <a:t>Future Upgrades</a:t>
+            </a:r>
+            <a:endParaRPr lang="en-US" dirty="0"/>
+          </a:p>
+        </p:txBody>
+      </p:sp>
+      <p:sp>
+        <p:nvSpPr>
+          <p:cNvPr id="3" name="Content Placeholder 2"/>
+          <p:cNvSpPr>
+            <a:spLocks noGrp="1"/>
+          </p:cNvSpPr>
+          <p:nvPr>
+            <p:ph idx="1"/>
+          </p:nvPr>
+        </p:nvSpPr>
+        <p:spPr/>
+        <p:txBody>
+          <a:bodyPr/>
+          <a:lstStyle/>
+          <a:p>
+            <a:r>
+              <a:rPr lang="en-US" dirty="0" smtClean="0"/>
+              <a:t>Calendar View Window</a:t>
+            </a:r>
+          </a:p>
+          <a:p>
+            <a:r>
+              <a:rPr lang="en-US" dirty="0" smtClean="0"/>
+              <a:t>Individual meal Selection, </a:t>
+            </a:r>
+            <a:r>
+              <a:rPr lang="en-US" dirty="0" err="1" smtClean="0"/>
+              <a:t>ie</a:t>
+            </a:r>
+            <a:r>
+              <a:rPr lang="en-US" dirty="0" smtClean="0"/>
+              <a:t>. Breakfast, Lunch, Supper, and Dessert.</a:t>
+            </a:r>
+          </a:p>
+          <a:p>
+            <a:endParaRPr lang="en-US" dirty="0"/>
+          </a:p>
+        </p:txBody>
+      </p:sp>
+    </p:spTree>
+    <p:extLst>
+      <p:ext uri="{BB962C8B-B14F-4D97-AF65-F5344CB8AC3E}">
+        <p14:creationId xmlns:p14="http://schemas.microsoft.com/office/powerpoint/2010/main" val="1287113894"/>
+      </p:ext>
+    </p:extLst>
+  </p:cSld>
+  <p:clrMapOvr>
+    <a:masterClrMapping/>
+  </p:clrMapOvr>
+</p:sld>
+</file>
+
+<file path=ppt/slides/slide11.xml><?xml version="1.0" encoding="utf-8"?>
+<p:sld xmlns:a="http://schemas.openxmlformats.org/drawingml/2006/main" xmlns:r="http://schemas.openxmlformats.org/officeDocument/2006/relationships" xmlns:p="http://schemas.openxmlformats.org/presentationml/2006/main">
+  <p:cSld>
+    <p:spTree>
+      <p:nvGrpSpPr>
+        <p:cNvPr id="1" name=""/>
+        <p:cNvGrpSpPr/>
+        <p:nvPr/>
+      </p:nvGrpSpPr>
+      <p:grpSpPr>
+        <a:xfrm>
+          <a:off x="0" y="0"/>
+          <a:ext cx="0" cy="0"/>
+          <a:chOff x="0" y="0"/>
+          <a:chExt cx="0" cy="0"/>
+        </a:xfrm>
+      </p:grpSpPr>
+      <p:pic>
+        <p:nvPicPr>
+          <p:cNvPr id="2" name="Picture 1"/>
+          <p:cNvPicPr>
+            <a:picLocks noChangeAspect="1"/>
+          </p:cNvPicPr>
+          <p:nvPr/>
+        </p:nvPicPr>
+        <p:blipFill>
+          <a:blip r:embed="rId2">
+            <a:extLst>
+              <a:ext uri="{28A0092B-C50C-407E-A947-70E740481C1C}">
+                <a14:useLocalDpi xmlns:a14="http://schemas.microsoft.com/office/drawing/2010/main" val="0"/>
+              </a:ext>
+            </a:extLst>
+          </a:blip>
+          <a:stretch>
+            <a:fillRect/>
+          </a:stretch>
+        </p:blipFill>
+        <p:spPr>
+          <a:xfrm>
+            <a:off x="2817340" y="723273"/>
+            <a:ext cx="8027774" cy="5180811"/>
+          </a:xfrm>
+          <a:prstGeom prst="rect">
+            <a:avLst/>
+          </a:prstGeom>
+        </p:spPr>
+      </p:pic>
+    </p:spTree>
+    <p:extLst>
+      <p:ext uri="{BB962C8B-B14F-4D97-AF65-F5344CB8AC3E}">
+        <p14:creationId xmlns:p14="http://schemas.microsoft.com/office/powerpoint/2010/main" val="1514185848"/>
+      </p:ext>
+    </p:extLst>
+  </p:cSld>
+  <p:clrMapOvr>
+    <a:masterClrMapping/>
+  </p:clrMapOvr>
+</p:sld>
+</file>
+
+<file path=ppt/slides/slide12.xml><?xml version="1.0" encoding="utf-8"?>
+<p:sld xmlns:a="http://schemas.openxmlformats.org/drawingml/2006/main" xmlns:r="http://schemas.openxmlformats.org/officeDocument/2006/relationships" xmlns:p="http://schemas.openxmlformats.org/presentationml/2006/main">
+  <p:cSld>
+    <p:spTree>
+      <p:nvGrpSpPr>
+        <p:cNvPr id="1" name=""/>
+        <p:cNvGrpSpPr/>
+        <p:nvPr/>
+      </p:nvGrpSpPr>
+      <p:grpSpPr>
+        <a:xfrm>
+          <a:off x="0" y="0"/>
+          <a:ext cx="0" cy="0"/>
+          <a:chOff x="0" y="0"/>
+          <a:chExt cx="0" cy="0"/>
+        </a:xfrm>
+      </p:grpSpPr>
+      <p:sp>
+        <p:nvSpPr>
+          <p:cNvPr id="2" name="TextBox 1"/>
+          <p:cNvSpPr txBox="1"/>
+          <p:nvPr/>
+        </p:nvSpPr>
+        <p:spPr>
+          <a:xfrm>
+            <a:off x="4683211" y="6041205"/>
+            <a:ext cx="5724510" cy="646331"/>
+          </a:xfrm>
+          <a:prstGeom prst="rect">
+            <a:avLst/>
+          </a:prstGeom>
+          <a:noFill/>
+        </p:spPr>
+        <p:txBody>
+          <a:bodyPr wrap="square" rtlCol="0">
+            <a:spAutoFit/>
+          </a:bodyPr>
+          <a:lstStyle/>
+          <a:p>
+            <a:r>
+              <a:rPr lang="en-US" b="1" dirty="0" smtClean="0">
+                <a:solidFill>
+                  <a:schemeClr val="accent1">
+                    <a:lumMod val="50000"/>
+                  </a:schemeClr>
+                </a:solidFill>
+              </a:rPr>
+              <a:t>***      No computers were harmed in the making of this Presentation or Project </a:t>
+            </a:r>
+            <a:r>
+              <a:rPr lang="is-IS" b="1" dirty="0" smtClean="0">
+                <a:solidFill>
+                  <a:schemeClr val="accent1">
+                    <a:lumMod val="50000"/>
+                  </a:schemeClr>
+                </a:solidFill>
+              </a:rPr>
+              <a:t>…  well, maybe a little.</a:t>
+            </a:r>
+            <a:endParaRPr lang="en-US" b="1" dirty="0">
+              <a:solidFill>
+                <a:schemeClr val="accent1">
+                  <a:lumMod val="50000"/>
+                </a:schemeClr>
+              </a:solidFill>
+            </a:endParaRPr>
+          </a:p>
+        </p:txBody>
+      </p:sp>
+      <p:pic>
+        <p:nvPicPr>
+          <p:cNvPr id="3" name="Picture 2"/>
+          <p:cNvPicPr>
+            <a:picLocks noChangeAspect="1"/>
+          </p:cNvPicPr>
+          <p:nvPr/>
+        </p:nvPicPr>
+        <p:blipFill>
+          <a:blip r:embed="rId2">
+            <a:extLst>
+              <a:ext uri="{28A0092B-C50C-407E-A947-70E740481C1C}">
+                <a14:useLocalDpi xmlns:a14="http://schemas.microsoft.com/office/drawing/2010/main" val="0"/>
+              </a:ext>
+            </a:extLst>
+          </a:blip>
+          <a:stretch>
+            <a:fillRect/>
+          </a:stretch>
+        </p:blipFill>
+        <p:spPr>
+          <a:xfrm>
+            <a:off x="3551194" y="410519"/>
+            <a:ext cx="6350000" cy="4826000"/>
+          </a:xfrm>
+          <a:prstGeom prst="rect">
+            <a:avLst/>
+          </a:prstGeom>
+        </p:spPr>
+      </p:pic>
+    </p:spTree>
+    <p:extLst>
+      <p:ext uri="{BB962C8B-B14F-4D97-AF65-F5344CB8AC3E}">
+        <p14:creationId xmlns:p14="http://schemas.microsoft.com/office/powerpoint/2010/main" val="2087711877"/>
+      </p:ext>
+    </p:extLst>
+  </p:cSld>
+  <p:clrMapOvr>
+    <a:masterClrMapping/>
+  </p:clrMapOvr>
+</p:sld>
+</file>
+
 <file path=ppt/slides/slide2.xml><?xml version="1.0" encoding="utf-8"?>
 <p:sld xmlns:a="http://schemas.openxmlformats.org/drawingml/2006/main" xmlns:r="http://schemas.openxmlformats.org/officeDocument/2006/relationships" xmlns:p="http://schemas.openxmlformats.org/presentationml/2006/main">
   <p:cSld>
@@ -6946,7 +7218,18 @@
           <a:p>
             <a:r>
               <a:rPr lang="en-US" dirty="0" smtClean="0"/>
-              <a:t>If you fail to plan, then plan to fail…</a:t>
+              <a:t>MEAL PLANNER – The Idea</a:t>
+            </a:r>
+            <a:br>
+              <a:rPr lang="en-US" dirty="0" smtClean="0"/>
+            </a:br>
+            <a:r>
+              <a:rPr lang="en-US" dirty="0" smtClean="0"/>
+              <a:t>If </a:t>
+            </a:r>
+            <a:r>
+              <a:rPr lang="en-US" dirty="0" smtClean="0"/>
+              <a:t>you fail to plan, then plan to fail…</a:t>
             </a:r>
             <a:endParaRPr lang="en-US" dirty="0"/>
           </a:p>
@@ -7013,6 +7296,13 @@
   <p:clrMapOvr>
     <a:masterClrMapping/>
   </p:clrMapOvr>
+  <p:timing>
+    <p:tnLst>
+      <p:par>
+        <p:cTn id="1" dur="indefinite" restart="never" nodeType="tmRoot"/>
+      </p:par>
+    </p:tnLst>
+  </p:timing>
 </p:sld>
 </file>
 
@@ -7050,7 +7340,11 @@
           <a:p>
             <a:r>
               <a:rPr lang="en-US" dirty="0" smtClean="0"/>
-              <a:t>Meal Planner</a:t>
+              <a:t>Meal </a:t>
+            </a:r>
+            <a:r>
+              <a:rPr lang="en-US" dirty="0" smtClean="0"/>
+              <a:t>Planner – The Application</a:t>
             </a:r>
             <a:endParaRPr lang="en-US" dirty="0"/>
           </a:p>
@@ -7068,7 +7362,9 @@
         </p:nvSpPr>
         <p:spPr/>
         <p:txBody>
-          <a:bodyPr/>
+          <a:bodyPr>
+            <a:normAutofit lnSpcReduction="10000"/>
+          </a:bodyPr>
           <a:lstStyle/>
           <a:p>
             <a:r>
@@ -7079,8 +7375,31 @@
           <a:p>
             <a:r>
               <a:rPr lang="en-US" dirty="0" smtClean="0"/>
-              <a:t>Allows for flexibility to add recipes, or select from the database.</a:t>
-            </a:r>
+              <a:t>Allows for flexibility to add recipes, or select from the database</a:t>
+            </a:r>
+            <a:r>
+              <a:rPr lang="en-US" dirty="0" smtClean="0"/>
+              <a:t>.</a:t>
+            </a:r>
+          </a:p>
+          <a:p>
+            <a:r>
+              <a:rPr lang="en-US" dirty="0" smtClean="0"/>
+              <a:t>Displays and calculates Nutritional information like Calorie, Fat, Protein, and Carbohydrate count.</a:t>
+            </a:r>
+          </a:p>
+          <a:p>
+            <a:r>
+              <a:rPr lang="en-US" dirty="0" smtClean="0"/>
+              <a:t>Application goal is to notify user if their combined daily calorie count exceeds their limit.</a:t>
+            </a:r>
+          </a:p>
+          <a:p>
+            <a:r>
+              <a:rPr lang="en-US" dirty="0" smtClean="0"/>
+              <a:t>Displays a Daily or weekly calendar of their selected meals.</a:t>
+            </a:r>
+            <a:endParaRPr lang="en-US" dirty="0" smtClean="0"/>
           </a:p>
           <a:p>
             <a:endParaRPr lang="en-US" dirty="0" smtClean="0"/>
@@ -7094,6 +7413,624 @@
     <p:extLst>
       <p:ext uri="{BB962C8B-B14F-4D97-AF65-F5344CB8AC3E}">
         <p14:creationId xmlns:p14="http://schemas.microsoft.com/office/powerpoint/2010/main" val="1001508736"/>
+      </p:ext>
+    </p:extLst>
+  </p:cSld>
+  <p:clrMapOvr>
+    <a:masterClrMapping/>
+  </p:clrMapOvr>
+  <p:timing>
+    <p:tnLst>
+      <p:par>
+        <p:cTn id="1" dur="indefinite" restart="never" nodeType="tmRoot"/>
+      </p:par>
+    </p:tnLst>
+  </p:timing>
+</p:sld>
+</file>
+
+<file path=ppt/slides/slide5.xml><?xml version="1.0" encoding="utf-8"?>
+<p:sld xmlns:a="http://schemas.openxmlformats.org/drawingml/2006/main" xmlns:r="http://schemas.openxmlformats.org/officeDocument/2006/relationships" xmlns:p="http://schemas.openxmlformats.org/presentationml/2006/main">
+  <p:cSld>
+    <p:spTree>
+      <p:nvGrpSpPr>
+        <p:cNvPr id="1" name=""/>
+        <p:cNvGrpSpPr/>
+        <p:nvPr/>
+      </p:nvGrpSpPr>
+      <p:grpSpPr>
+        <a:xfrm>
+          <a:off x="0" y="0"/>
+          <a:ext cx="0" cy="0"/>
+          <a:chOff x="0" y="0"/>
+          <a:chExt cx="0" cy="0"/>
+        </a:xfrm>
+      </p:grpSpPr>
+      <p:sp>
+        <p:nvSpPr>
+          <p:cNvPr id="2" name="Title 1"/>
+          <p:cNvSpPr>
+            <a:spLocks noGrp="1"/>
+          </p:cNvSpPr>
+          <p:nvPr>
+            <p:ph type="title"/>
+          </p:nvPr>
+        </p:nvSpPr>
+        <p:spPr/>
+        <p:txBody>
+          <a:bodyPr/>
+          <a:lstStyle/>
+          <a:p>
+            <a:r>
+              <a:rPr lang="en-US" dirty="0" smtClean="0"/>
+              <a:t>Challenges </a:t>
+            </a:r>
+            <a:endParaRPr lang="en-US" dirty="0"/>
+          </a:p>
+        </p:txBody>
+      </p:sp>
+      <p:sp>
+        <p:nvSpPr>
+          <p:cNvPr id="3" name="Content Placeholder 2"/>
+          <p:cNvSpPr>
+            <a:spLocks noGrp="1"/>
+          </p:cNvSpPr>
+          <p:nvPr>
+            <p:ph idx="1"/>
+          </p:nvPr>
+        </p:nvSpPr>
+        <p:spPr/>
+        <p:txBody>
+          <a:bodyPr/>
+          <a:lstStyle/>
+          <a:p>
+            <a:r>
+              <a:rPr lang="en-US" dirty="0" smtClean="0"/>
+              <a:t>Design &amp; Implementation</a:t>
+            </a:r>
+          </a:p>
+          <a:p>
+            <a:r>
+              <a:rPr lang="en-US" dirty="0" smtClean="0"/>
+              <a:t>Technological -   </a:t>
+            </a:r>
+          </a:p>
+          <a:p>
+            <a:pPr lvl="1"/>
+            <a:r>
+              <a:rPr lang="en-US" dirty="0" smtClean="0"/>
+              <a:t>Validation</a:t>
+            </a:r>
+          </a:p>
+          <a:p>
+            <a:pPr lvl="1"/>
+            <a:r>
+              <a:rPr lang="en-US" dirty="0" err="1" smtClean="0"/>
+              <a:t>Github</a:t>
+            </a:r>
+            <a:endParaRPr lang="en-US" dirty="0" smtClean="0"/>
+          </a:p>
+          <a:p>
+            <a:pPr lvl="1"/>
+            <a:r>
+              <a:rPr lang="en-US" dirty="0" err="1" smtClean="0"/>
+              <a:t>Combobox</a:t>
+            </a:r>
+            <a:r>
+              <a:rPr lang="en-US" dirty="0" smtClean="0"/>
+              <a:t> / Database</a:t>
+            </a:r>
+          </a:p>
+          <a:p>
+            <a:pPr lvl="1"/>
+            <a:r>
+              <a:rPr lang="en-US" dirty="0" err="1" smtClean="0"/>
+              <a:t>Datagrids</a:t>
+            </a:r>
+            <a:endParaRPr lang="en-US" dirty="0"/>
+          </a:p>
+        </p:txBody>
+      </p:sp>
+      <p:pic>
+        <p:nvPicPr>
+          <p:cNvPr id="4" name="Picture 3"/>
+          <p:cNvPicPr>
+            <a:picLocks noChangeAspect="1"/>
+          </p:cNvPicPr>
+          <p:nvPr/>
+        </p:nvPicPr>
+        <p:blipFill>
+          <a:blip r:embed="rId2"/>
+          <a:stretch>
+            <a:fillRect/>
+          </a:stretch>
+        </p:blipFill>
+        <p:spPr>
+          <a:xfrm>
+            <a:off x="9073398" y="243011"/>
+            <a:ext cx="2224141" cy="1820567"/>
+          </a:xfrm>
+          <a:prstGeom prst="rect">
+            <a:avLst/>
+          </a:prstGeom>
+        </p:spPr>
+      </p:pic>
+      <p:pic>
+        <p:nvPicPr>
+          <p:cNvPr id="5" name="Picture 4"/>
+          <p:cNvPicPr>
+            <a:picLocks noChangeAspect="1"/>
+          </p:cNvPicPr>
+          <p:nvPr/>
+        </p:nvPicPr>
+        <p:blipFill>
+          <a:blip r:embed="rId3">
+            <a:extLst>
+              <a:ext uri="{28A0092B-C50C-407E-A947-70E740481C1C}">
+                <a14:useLocalDpi xmlns:a14="http://schemas.microsoft.com/office/drawing/2010/main" val="0"/>
+              </a:ext>
+            </a:extLst>
+          </a:blip>
+          <a:stretch>
+            <a:fillRect/>
+          </a:stretch>
+        </p:blipFill>
+        <p:spPr>
+          <a:xfrm>
+            <a:off x="1930400" y="243011"/>
+            <a:ext cx="1981798" cy="1820567"/>
+          </a:xfrm>
+          <a:prstGeom prst="rect">
+            <a:avLst/>
+          </a:prstGeom>
+        </p:spPr>
+      </p:pic>
+    </p:spTree>
+    <p:extLst>
+      <p:ext uri="{BB962C8B-B14F-4D97-AF65-F5344CB8AC3E}">
+        <p14:creationId xmlns:p14="http://schemas.microsoft.com/office/powerpoint/2010/main" val="460449275"/>
+      </p:ext>
+    </p:extLst>
+  </p:cSld>
+  <p:clrMapOvr>
+    <a:masterClrMapping/>
+  </p:clrMapOvr>
+  <p:timing>
+    <p:tnLst>
+      <p:par>
+        <p:cTn id="1" dur="indefinite" restart="never" nodeType="tmRoot"/>
+      </p:par>
+    </p:tnLst>
+  </p:timing>
+</p:sld>
+</file>
+
+<file path=ppt/slides/slide6.xml><?xml version="1.0" encoding="utf-8"?>
+<p:sld xmlns:a="http://schemas.openxmlformats.org/drawingml/2006/main" xmlns:r="http://schemas.openxmlformats.org/officeDocument/2006/relationships" xmlns:p="http://schemas.openxmlformats.org/presentationml/2006/main">
+  <p:cSld>
+    <p:spTree>
+      <p:nvGrpSpPr>
+        <p:cNvPr id="1" name=""/>
+        <p:cNvGrpSpPr/>
+        <p:nvPr/>
+      </p:nvGrpSpPr>
+      <p:grpSpPr>
+        <a:xfrm>
+          <a:off x="0" y="0"/>
+          <a:ext cx="0" cy="0"/>
+          <a:chOff x="0" y="0"/>
+          <a:chExt cx="0" cy="0"/>
+        </a:xfrm>
+      </p:grpSpPr>
+      <p:sp>
+        <p:nvSpPr>
+          <p:cNvPr id="2" name="Title 1"/>
+          <p:cNvSpPr>
+            <a:spLocks noGrp="1"/>
+          </p:cNvSpPr>
+          <p:nvPr>
+            <p:ph type="title"/>
+          </p:nvPr>
+        </p:nvSpPr>
+        <p:spPr/>
+        <p:txBody>
+          <a:bodyPr/>
+          <a:lstStyle/>
+          <a:p>
+            <a:r>
+              <a:rPr lang="en-US" dirty="0" smtClean="0"/>
+              <a:t>Validation</a:t>
+            </a:r>
+            <a:endParaRPr lang="en-US" dirty="0"/>
+          </a:p>
+        </p:txBody>
+      </p:sp>
+      <p:pic>
+        <p:nvPicPr>
+          <p:cNvPr id="4" name="Content Placeholder 3"/>
+          <p:cNvPicPr>
+            <a:picLocks noGrp="1" noChangeAspect="1"/>
+          </p:cNvPicPr>
+          <p:nvPr>
+            <p:ph idx="1"/>
+          </p:nvPr>
+        </p:nvPicPr>
+        <p:blipFill>
+          <a:blip r:embed="rId2">
+            <a:extLst>
+              <a:ext uri="{28A0092B-C50C-407E-A947-70E740481C1C}">
+                <a14:useLocalDpi xmlns:a14="http://schemas.microsoft.com/office/drawing/2010/main" val="0"/>
+              </a:ext>
+            </a:extLst>
+          </a:blip>
+          <a:stretch>
+            <a:fillRect/>
+          </a:stretch>
+        </p:blipFill>
+        <p:spPr>
+          <a:xfrm>
+            <a:off x="1355080" y="2310713"/>
+            <a:ext cx="10680401" cy="2726639"/>
+          </a:xfrm>
+        </p:spPr>
+      </p:pic>
+    </p:spTree>
+    <p:extLst>
+      <p:ext uri="{BB962C8B-B14F-4D97-AF65-F5344CB8AC3E}">
+        <p14:creationId xmlns:p14="http://schemas.microsoft.com/office/powerpoint/2010/main" val="1390906300"/>
+      </p:ext>
+    </p:extLst>
+  </p:cSld>
+  <p:clrMapOvr>
+    <a:masterClrMapping/>
+  </p:clrMapOvr>
+</p:sld>
+</file>
+
+<file path=ppt/slides/slide7.xml><?xml version="1.0" encoding="utf-8"?>
+<p:sld xmlns:a="http://schemas.openxmlformats.org/drawingml/2006/main" xmlns:r="http://schemas.openxmlformats.org/officeDocument/2006/relationships" xmlns:p="http://schemas.openxmlformats.org/presentationml/2006/main">
+  <p:cSld>
+    <p:spTree>
+      <p:nvGrpSpPr>
+        <p:cNvPr id="1" name=""/>
+        <p:cNvGrpSpPr/>
+        <p:nvPr/>
+      </p:nvGrpSpPr>
+      <p:grpSpPr>
+        <a:xfrm>
+          <a:off x="0" y="0"/>
+          <a:ext cx="0" cy="0"/>
+          <a:chOff x="0" y="0"/>
+          <a:chExt cx="0" cy="0"/>
+        </a:xfrm>
+      </p:grpSpPr>
+      <p:sp>
+        <p:nvSpPr>
+          <p:cNvPr id="2" name="Title 1"/>
+          <p:cNvSpPr>
+            <a:spLocks noGrp="1"/>
+          </p:cNvSpPr>
+          <p:nvPr>
+            <p:ph type="title"/>
+          </p:nvPr>
+        </p:nvSpPr>
+        <p:spPr/>
+        <p:txBody>
+          <a:bodyPr/>
+          <a:lstStyle/>
+          <a:p>
+            <a:r>
+              <a:rPr lang="en-US" dirty="0" err="1" smtClean="0"/>
+              <a:t>Datagrids</a:t>
+            </a:r>
+            <a:endParaRPr lang="en-US" dirty="0"/>
+          </a:p>
+        </p:txBody>
+      </p:sp>
+      <p:sp>
+        <p:nvSpPr>
+          <p:cNvPr id="3" name="Content Placeholder 2"/>
+          <p:cNvSpPr>
+            <a:spLocks noGrp="1"/>
+          </p:cNvSpPr>
+          <p:nvPr>
+            <p:ph idx="1"/>
+          </p:nvPr>
+        </p:nvSpPr>
+        <p:spPr/>
+        <p:txBody>
+          <a:bodyPr/>
+          <a:lstStyle/>
+          <a:p>
+            <a:endParaRPr lang="en-US"/>
+          </a:p>
+        </p:txBody>
+      </p:sp>
+    </p:spTree>
+    <p:extLst>
+      <p:ext uri="{BB962C8B-B14F-4D97-AF65-F5344CB8AC3E}">
+        <p14:creationId xmlns:p14="http://schemas.microsoft.com/office/powerpoint/2010/main" val="398625562"/>
+      </p:ext>
+    </p:extLst>
+  </p:cSld>
+  <p:clrMapOvr>
+    <a:masterClrMapping/>
+  </p:clrMapOvr>
+  <p:timing>
+    <p:tnLst>
+      <p:par>
+        <p:cTn id="1" dur="indefinite" restart="never" nodeType="tmRoot"/>
+      </p:par>
+    </p:tnLst>
+  </p:timing>
+</p:sld>
+</file>
+
+<file path=ppt/slides/slide8.xml><?xml version="1.0" encoding="utf-8"?>
+<p:sld xmlns:a="http://schemas.openxmlformats.org/drawingml/2006/main" xmlns:r="http://schemas.openxmlformats.org/officeDocument/2006/relationships" xmlns:p="http://schemas.openxmlformats.org/presentationml/2006/main">
+  <p:cSld>
+    <p:spTree>
+      <p:nvGrpSpPr>
+        <p:cNvPr id="1" name=""/>
+        <p:cNvGrpSpPr/>
+        <p:nvPr/>
+      </p:nvGrpSpPr>
+      <p:grpSpPr>
+        <a:xfrm>
+          <a:off x="0" y="0"/>
+          <a:ext cx="0" cy="0"/>
+          <a:chOff x="0" y="0"/>
+          <a:chExt cx="0" cy="0"/>
+        </a:xfrm>
+      </p:grpSpPr>
+      <p:sp>
+        <p:nvSpPr>
+          <p:cNvPr id="2" name="Title 1"/>
+          <p:cNvSpPr>
+            <a:spLocks noGrp="1"/>
+          </p:cNvSpPr>
+          <p:nvPr>
+            <p:ph type="title"/>
+          </p:nvPr>
+        </p:nvSpPr>
+        <p:spPr/>
+        <p:txBody>
+          <a:bodyPr/>
+          <a:lstStyle/>
+          <a:p>
+            <a:r>
+              <a:rPr lang="en-US" dirty="0"/>
+              <a:t>T.E.A.</a:t>
+            </a:r>
+            <a:br>
+              <a:rPr lang="en-US" dirty="0"/>
+            </a:br>
+            <a:r>
+              <a:rPr lang="en-US" dirty="0"/>
+              <a:t>(Technical Educational Advancements)</a:t>
+            </a:r>
+            <a:br>
+              <a:rPr lang="en-US" dirty="0"/>
+            </a:br>
+            <a:r>
+              <a:rPr lang="en-US" sz="1600" dirty="0"/>
+              <a:t>(Also known as “What we learned”)</a:t>
+            </a:r>
+            <a:endParaRPr lang="en-US" dirty="0"/>
+          </a:p>
+        </p:txBody>
+      </p:sp>
+      <p:sp>
+        <p:nvSpPr>
+          <p:cNvPr id="3" name="Content Placeholder 2"/>
+          <p:cNvSpPr>
+            <a:spLocks noGrp="1"/>
+          </p:cNvSpPr>
+          <p:nvPr>
+            <p:ph idx="1"/>
+          </p:nvPr>
+        </p:nvSpPr>
+        <p:spPr/>
+        <p:txBody>
+          <a:bodyPr/>
+          <a:lstStyle/>
+          <a:p>
+            <a:r>
+              <a:rPr lang="en-US" dirty="0" smtClean="0"/>
+              <a:t>Listing items in </a:t>
+            </a:r>
+            <a:r>
+              <a:rPr lang="en-US" dirty="0" err="1" smtClean="0"/>
+              <a:t>ComboBox</a:t>
+            </a:r>
+            <a:r>
+              <a:rPr lang="en-US" dirty="0" smtClean="0"/>
+              <a:t> from Database.</a:t>
+            </a:r>
+          </a:p>
+          <a:p>
+            <a:endParaRPr lang="en-US" dirty="0" smtClean="0"/>
+          </a:p>
+          <a:p>
+            <a:endParaRPr lang="en-US" dirty="0"/>
+          </a:p>
+          <a:p>
+            <a:endParaRPr lang="en-US" dirty="0" smtClean="0"/>
+          </a:p>
+          <a:p>
+            <a:endParaRPr lang="en-US" dirty="0"/>
+          </a:p>
+          <a:p>
+            <a:endParaRPr lang="en-US" dirty="0"/>
+          </a:p>
+        </p:txBody>
+      </p:sp>
+      <p:pic>
+        <p:nvPicPr>
+          <p:cNvPr id="4" name="Content Placeholder 3"/>
+          <p:cNvPicPr>
+            <a:picLocks noChangeAspect="1"/>
+          </p:cNvPicPr>
+          <p:nvPr/>
+        </p:nvPicPr>
+        <p:blipFill>
+          <a:blip r:embed="rId2">
+            <a:extLst>
+              <a:ext uri="{28A0092B-C50C-407E-A947-70E740481C1C}">
+                <a14:useLocalDpi xmlns:a14="http://schemas.microsoft.com/office/drawing/2010/main" val="0"/>
+              </a:ext>
+            </a:extLst>
+          </a:blip>
+          <a:stretch>
+            <a:fillRect/>
+          </a:stretch>
+        </p:blipFill>
+        <p:spPr>
+          <a:xfrm>
+            <a:off x="8017699" y="89848"/>
+            <a:ext cx="1521718" cy="1472251"/>
+          </a:xfrm>
+          <a:prstGeom prst="rect">
+            <a:avLst/>
+          </a:prstGeom>
+        </p:spPr>
+      </p:pic>
+      <p:pic>
+        <p:nvPicPr>
+          <p:cNvPr id="5" name="Picture 4"/>
+          <p:cNvPicPr>
+            <a:picLocks noChangeAspect="1"/>
+          </p:cNvPicPr>
+          <p:nvPr/>
+        </p:nvPicPr>
+        <p:blipFill>
+          <a:blip r:embed="rId3">
+            <a:extLst>
+              <a:ext uri="{28A0092B-C50C-407E-A947-70E740481C1C}">
+                <a14:useLocalDpi xmlns:a14="http://schemas.microsoft.com/office/drawing/2010/main" val="0"/>
+              </a:ext>
+            </a:extLst>
+          </a:blip>
+          <a:stretch>
+            <a:fillRect/>
+          </a:stretch>
+        </p:blipFill>
+        <p:spPr>
+          <a:xfrm>
+            <a:off x="3310455" y="3336324"/>
+            <a:ext cx="7680678" cy="3299253"/>
+          </a:xfrm>
+          <a:prstGeom prst="rect">
+            <a:avLst/>
+          </a:prstGeom>
+        </p:spPr>
+      </p:pic>
+    </p:spTree>
+    <p:extLst>
+      <p:ext uri="{BB962C8B-B14F-4D97-AF65-F5344CB8AC3E}">
+        <p14:creationId xmlns:p14="http://schemas.microsoft.com/office/powerpoint/2010/main" val="1552215310"/>
+      </p:ext>
+    </p:extLst>
+  </p:cSld>
+  <p:clrMapOvr>
+    <a:masterClrMapping/>
+  </p:clrMapOvr>
+</p:sld>
+</file>
+
+<file path=ppt/slides/slide9.xml><?xml version="1.0" encoding="utf-8"?>
+<p:sld xmlns:a="http://schemas.openxmlformats.org/drawingml/2006/main" xmlns:r="http://schemas.openxmlformats.org/officeDocument/2006/relationships" xmlns:p="http://schemas.openxmlformats.org/presentationml/2006/main">
+  <p:cSld>
+    <p:spTree>
+      <p:nvGrpSpPr>
+        <p:cNvPr id="1" name=""/>
+        <p:cNvGrpSpPr/>
+        <p:nvPr/>
+      </p:nvGrpSpPr>
+      <p:grpSpPr>
+        <a:xfrm>
+          <a:off x="0" y="0"/>
+          <a:ext cx="0" cy="0"/>
+          <a:chOff x="0" y="0"/>
+          <a:chExt cx="0" cy="0"/>
+        </a:xfrm>
+      </p:grpSpPr>
+      <p:sp>
+        <p:nvSpPr>
+          <p:cNvPr id="3" name="Content Placeholder 2"/>
+          <p:cNvSpPr>
+            <a:spLocks noGrp="1"/>
+          </p:cNvSpPr>
+          <p:nvPr>
+            <p:ph idx="1"/>
+          </p:nvPr>
+        </p:nvSpPr>
+        <p:spPr>
+          <a:xfrm>
+            <a:off x="1484310" y="1075039"/>
+            <a:ext cx="10018713" cy="4716162"/>
+          </a:xfrm>
+        </p:spPr>
+        <p:txBody>
+          <a:bodyPr/>
+          <a:lstStyle/>
+          <a:p>
+            <a:r>
+              <a:rPr lang="en-US" dirty="0" smtClean="0"/>
+              <a:t>Connecting to another window.</a:t>
+            </a:r>
+          </a:p>
+          <a:p>
+            <a:endParaRPr lang="en-US" dirty="0"/>
+          </a:p>
+          <a:p>
+            <a:endParaRPr lang="en-US" dirty="0" smtClean="0"/>
+          </a:p>
+          <a:p>
+            <a:endParaRPr lang="en-US" dirty="0"/>
+          </a:p>
+          <a:p>
+            <a:endParaRPr lang="en-US" dirty="0" smtClean="0"/>
+          </a:p>
+          <a:p>
+            <a:endParaRPr lang="en-US" dirty="0"/>
+          </a:p>
+        </p:txBody>
+      </p:sp>
+      <p:pic>
+        <p:nvPicPr>
+          <p:cNvPr id="5" name="Picture 4"/>
+          <p:cNvPicPr>
+            <a:picLocks noChangeAspect="1"/>
+          </p:cNvPicPr>
+          <p:nvPr/>
+        </p:nvPicPr>
+        <p:blipFill>
+          <a:blip r:embed="rId2">
+            <a:extLst>
+              <a:ext uri="{28A0092B-C50C-407E-A947-70E740481C1C}">
+                <a14:useLocalDpi xmlns:a14="http://schemas.microsoft.com/office/drawing/2010/main" val="0"/>
+              </a:ext>
+            </a:extLst>
+          </a:blip>
+          <a:stretch>
+            <a:fillRect/>
+          </a:stretch>
+        </p:blipFill>
+        <p:spPr>
+          <a:xfrm>
+            <a:off x="2269275" y="3065405"/>
+            <a:ext cx="8135114" cy="1889653"/>
+          </a:xfrm>
+          <a:prstGeom prst="rect">
+            <a:avLst/>
+          </a:prstGeom>
+        </p:spPr>
+      </p:pic>
+    </p:spTree>
+    <p:extLst>
+      <p:ext uri="{BB962C8B-B14F-4D97-AF65-F5344CB8AC3E}">
+        <p14:creationId xmlns:p14="http://schemas.microsoft.com/office/powerpoint/2010/main" val="1833283282"/>
       </p:ext>
     </p:extLst>
   </p:cSld>

</xml_diff>